<commit_message>
updates, documents, and aws .pem file updated
</commit_message>
<xml_diff>
--- a/updates/update1.pptx
+++ b/updates/update1.pptx
@@ -115,6 +115,11 @@
       </a:defRPr>
     </a:lvl9pPr>
   </p:defaultTextStyle>
+  <p:extLst>
+    <p:ext uri="{EFAFB233-063F-42B5-8137-9DF3F51BA10A}">
+      <p15:sldGuideLst xmlns:p15="http://schemas.microsoft.com/office/powerpoint/2012/main"/>
+    </p:ext>
+  </p:extLst>
 </p:presentation>
 </file>
 
@@ -287,7 +292,7 @@
           <a:p>
             <a:fld id="{7E98F6FC-1C7F-3744-BA49-05BDDFEFE0C0}" type="datetimeFigureOut">
               <a:rPr lang="en-US" smtClean="0"/>
-              <a:t>1/12/22</a:t>
+              <a:t>2/9/22</a:t>
             </a:fld>
             <a:endParaRPr lang="en-US"/>
           </a:p>
@@ -617,7 +622,7 @@
           <a:p>
             <a:fld id="{7E98F6FC-1C7F-3744-BA49-05BDDFEFE0C0}" type="datetimeFigureOut">
               <a:rPr lang="en-US" smtClean="0"/>
-              <a:t>1/12/22</a:t>
+              <a:t>2/9/22</a:t>
             </a:fld>
             <a:endParaRPr lang="en-US"/>
           </a:p>
@@ -797,7 +802,7 @@
           <a:p>
             <a:fld id="{7E98F6FC-1C7F-3744-BA49-05BDDFEFE0C0}" type="datetimeFigureOut">
               <a:rPr lang="en-US" smtClean="0"/>
-              <a:t>1/12/22</a:t>
+              <a:t>2/9/22</a:t>
             </a:fld>
             <a:endParaRPr lang="en-US"/>
           </a:p>
@@ -967,7 +972,7 @@
           <a:p>
             <a:fld id="{7E98F6FC-1C7F-3744-BA49-05BDDFEFE0C0}" type="datetimeFigureOut">
               <a:rPr lang="en-US" smtClean="0"/>
-              <a:t>1/12/22</a:t>
+              <a:t>2/9/22</a:t>
             </a:fld>
             <a:endParaRPr lang="en-US"/>
           </a:p>
@@ -1244,7 +1249,7 @@
           <a:p>
             <a:fld id="{7E98F6FC-1C7F-3744-BA49-05BDDFEFE0C0}" type="datetimeFigureOut">
               <a:rPr lang="en-US" smtClean="0"/>
-              <a:t>1/12/22</a:t>
+              <a:t>2/9/22</a:t>
             </a:fld>
             <a:endParaRPr lang="en-US"/>
           </a:p>
@@ -1638,7 +1643,7 @@
           <a:p>
             <a:fld id="{7E98F6FC-1C7F-3744-BA49-05BDDFEFE0C0}" type="datetimeFigureOut">
               <a:rPr lang="en-US" smtClean="0"/>
-              <a:t>1/12/22</a:t>
+              <a:t>2/9/22</a:t>
             </a:fld>
             <a:endParaRPr lang="en-US"/>
           </a:p>
@@ -2115,7 +2120,7 @@
           <a:p>
             <a:fld id="{7E98F6FC-1C7F-3744-BA49-05BDDFEFE0C0}" type="datetimeFigureOut">
               <a:rPr lang="en-US" smtClean="0"/>
-              <a:t>1/12/22</a:t>
+              <a:t>2/9/22</a:t>
             </a:fld>
             <a:endParaRPr lang="en-US"/>
           </a:p>
@@ -2233,7 +2238,7 @@
           <a:p>
             <a:fld id="{7E98F6FC-1C7F-3744-BA49-05BDDFEFE0C0}" type="datetimeFigureOut">
               <a:rPr lang="en-US" smtClean="0"/>
-              <a:t>1/12/22</a:t>
+              <a:t>2/9/22</a:t>
             </a:fld>
             <a:endParaRPr lang="en-US"/>
           </a:p>
@@ -2328,7 +2333,7 @@
           <a:p>
             <a:fld id="{7E98F6FC-1C7F-3744-BA49-05BDDFEFE0C0}" type="datetimeFigureOut">
               <a:rPr lang="en-US" smtClean="0"/>
-              <a:t>1/12/22</a:t>
+              <a:t>2/9/22</a:t>
             </a:fld>
             <a:endParaRPr lang="en-US"/>
           </a:p>
@@ -2674,7 +2679,7 @@
           <a:p>
             <a:fld id="{7E98F6FC-1C7F-3744-BA49-05BDDFEFE0C0}" type="datetimeFigureOut">
               <a:rPr lang="en-US" smtClean="0"/>
-              <a:t>1/12/22</a:t>
+              <a:t>2/9/22</a:t>
             </a:fld>
             <a:endParaRPr lang="en-US"/>
           </a:p>
@@ -3062,7 +3067,7 @@
           <a:p>
             <a:fld id="{7E98F6FC-1C7F-3744-BA49-05BDDFEFE0C0}" type="datetimeFigureOut">
               <a:rPr lang="en-US" smtClean="0"/>
-              <a:t>1/12/22</a:t>
+              <a:t>2/9/22</a:t>
             </a:fld>
             <a:endParaRPr lang="en-US"/>
           </a:p>
@@ -3340,7 +3345,7 @@
           <a:p>
             <a:fld id="{7E98F6FC-1C7F-3744-BA49-05BDDFEFE0C0}" type="datetimeFigureOut">
               <a:rPr lang="en-US" smtClean="0"/>
-              <a:t>1/12/22</a:t>
+              <a:t>2/9/22</a:t>
             </a:fld>
             <a:endParaRPr lang="en-US"/>
           </a:p>

</xml_diff>